<commit_message>
AI PHASE 3 PROJECT
</commit_message>
<xml_diff>
--- a/AI PHASE 3.pptx
+++ b/AI PHASE 3.pptx
@@ -110,7 +110,41 @@
       </a:defRPr>
     </a:lvl9pPr>
   </p:defaultTextStyle>
+  <p:extLst>
+    <p:ext uri="{EFAFB233-063F-42B5-8137-9DF3F51BA10A}">
+      <p15:sldGuideLst xmlns:p15="http://schemas.microsoft.com/office/powerpoint/2012/main"/>
+    </p:ext>
+  </p:extLst>
 </p:presentation>
+</file>
+
+<file path=ppt/changesInfos/changesInfo1.xml><?xml version="1.0" encoding="utf-8"?>
+<pc:chgInfo xmlns:a="http://schemas.openxmlformats.org/drawingml/2006/main" xmlns:r="http://schemas.openxmlformats.org/officeDocument/2006/relationships" xmlns:ac="http://schemas.microsoft.com/office/drawing/2013/main/command" xmlns:pc="http://schemas.microsoft.com/office/powerpoint/2013/main/command">
+  <pc:docChgLst>
+    <pc:chgData name="Ashmi Sharon" userId="d607ffaf41f94747" providerId="LiveId" clId="{F4F90DB6-FF38-43EB-9416-F2C41FE8A6E2}"/>
+    <pc:docChg chg="custSel modSld">
+      <pc:chgData name="Ashmi Sharon" userId="d607ffaf41f94747" providerId="LiveId" clId="{F4F90DB6-FF38-43EB-9416-F2C41FE8A6E2}" dt="2023-10-17T18:41:54.237" v="18" actId="27636"/>
+      <pc:docMkLst>
+        <pc:docMk/>
+      </pc:docMkLst>
+      <pc:sldChg chg="modSp mod">
+        <pc:chgData name="Ashmi Sharon" userId="d607ffaf41f94747" providerId="LiveId" clId="{F4F90DB6-FF38-43EB-9416-F2C41FE8A6E2}" dt="2023-10-17T18:41:54.237" v="18" actId="27636"/>
+        <pc:sldMkLst>
+          <pc:docMk/>
+          <pc:sldMk cId="1803629409" sldId="256"/>
+        </pc:sldMkLst>
+        <pc:spChg chg="mod">
+          <ac:chgData name="Ashmi Sharon" userId="d607ffaf41f94747" providerId="LiveId" clId="{F4F90DB6-FF38-43EB-9416-F2C41FE8A6E2}" dt="2023-10-17T18:41:54.237" v="18" actId="27636"/>
+          <ac:spMkLst>
+            <pc:docMk/>
+            <pc:sldMk cId="1803629409" sldId="256"/>
+            <ac:spMk id="3" creationId="{5CE89CD1-8F8D-5AE0-809C-FFA476B14E8D}"/>
+          </ac:spMkLst>
+        </pc:spChg>
+      </pc:sldChg>
+    </pc:docChg>
+  </pc:docChgLst>
+</pc:chgInfo>
 </file>
 
 <file path=ppt/slideLayouts/slideLayout1.xml><?xml version="1.0" encoding="utf-8"?>
@@ -262,7 +296,7 @@
           <a:p>
             <a:fld id="{D005C9EA-83D5-4ACA-A1CC-C52DA5EDA437}" type="datetimeFigureOut">
               <a:rPr lang="en-IN" smtClean="0"/>
-              <a:t>17-10-2023</a:t>
+              <a:t>18-10-2023</a:t>
             </a:fld>
             <a:endParaRPr lang="en-IN"/>
           </a:p>
@@ -462,7 +496,7 @@
           <a:p>
             <a:fld id="{D005C9EA-83D5-4ACA-A1CC-C52DA5EDA437}" type="datetimeFigureOut">
               <a:rPr lang="en-IN" smtClean="0"/>
-              <a:t>17-10-2023</a:t>
+              <a:t>18-10-2023</a:t>
             </a:fld>
             <a:endParaRPr lang="en-IN"/>
           </a:p>
@@ -672,7 +706,7 @@
           <a:p>
             <a:fld id="{D005C9EA-83D5-4ACA-A1CC-C52DA5EDA437}" type="datetimeFigureOut">
               <a:rPr lang="en-IN" smtClean="0"/>
-              <a:t>17-10-2023</a:t>
+              <a:t>18-10-2023</a:t>
             </a:fld>
             <a:endParaRPr lang="en-IN"/>
           </a:p>
@@ -872,7 +906,7 @@
           <a:p>
             <a:fld id="{D005C9EA-83D5-4ACA-A1CC-C52DA5EDA437}" type="datetimeFigureOut">
               <a:rPr lang="en-IN" smtClean="0"/>
-              <a:t>17-10-2023</a:t>
+              <a:t>18-10-2023</a:t>
             </a:fld>
             <a:endParaRPr lang="en-IN"/>
           </a:p>
@@ -1148,7 +1182,7 @@
           <a:p>
             <a:fld id="{D005C9EA-83D5-4ACA-A1CC-C52DA5EDA437}" type="datetimeFigureOut">
               <a:rPr lang="en-IN" smtClean="0"/>
-              <a:t>17-10-2023</a:t>
+              <a:t>18-10-2023</a:t>
             </a:fld>
             <a:endParaRPr lang="en-IN"/>
           </a:p>
@@ -1416,7 +1450,7 @@
           <a:p>
             <a:fld id="{D005C9EA-83D5-4ACA-A1CC-C52DA5EDA437}" type="datetimeFigureOut">
               <a:rPr lang="en-IN" smtClean="0"/>
-              <a:t>17-10-2023</a:t>
+              <a:t>18-10-2023</a:t>
             </a:fld>
             <a:endParaRPr lang="en-IN"/>
           </a:p>
@@ -1831,7 +1865,7 @@
           <a:p>
             <a:fld id="{D005C9EA-83D5-4ACA-A1CC-C52DA5EDA437}" type="datetimeFigureOut">
               <a:rPr lang="en-IN" smtClean="0"/>
-              <a:t>17-10-2023</a:t>
+              <a:t>18-10-2023</a:t>
             </a:fld>
             <a:endParaRPr lang="en-IN"/>
           </a:p>
@@ -1973,7 +2007,7 @@
           <a:p>
             <a:fld id="{D005C9EA-83D5-4ACA-A1CC-C52DA5EDA437}" type="datetimeFigureOut">
               <a:rPr lang="en-IN" smtClean="0"/>
-              <a:t>17-10-2023</a:t>
+              <a:t>18-10-2023</a:t>
             </a:fld>
             <a:endParaRPr lang="en-IN"/>
           </a:p>
@@ -2086,7 +2120,7 @@
           <a:p>
             <a:fld id="{D005C9EA-83D5-4ACA-A1CC-C52DA5EDA437}" type="datetimeFigureOut">
               <a:rPr lang="en-IN" smtClean="0"/>
-              <a:t>17-10-2023</a:t>
+              <a:t>18-10-2023</a:t>
             </a:fld>
             <a:endParaRPr lang="en-IN"/>
           </a:p>
@@ -2399,7 +2433,7 @@
           <a:p>
             <a:fld id="{D005C9EA-83D5-4ACA-A1CC-C52DA5EDA437}" type="datetimeFigureOut">
               <a:rPr lang="en-IN" smtClean="0"/>
-              <a:t>17-10-2023</a:t>
+              <a:t>18-10-2023</a:t>
             </a:fld>
             <a:endParaRPr lang="en-IN"/>
           </a:p>
@@ -2688,7 +2722,7 @@
           <a:p>
             <a:fld id="{D005C9EA-83D5-4ACA-A1CC-C52DA5EDA437}" type="datetimeFigureOut">
               <a:rPr lang="en-IN" smtClean="0"/>
-              <a:t>17-10-2023</a:t>
+              <a:t>18-10-2023</a:t>
             </a:fld>
             <a:endParaRPr lang="en-IN"/>
           </a:p>
@@ -2931,7 +2965,7 @@
           <a:p>
             <a:fld id="{D005C9EA-83D5-4ACA-A1CC-C52DA5EDA437}" type="datetimeFigureOut">
               <a:rPr lang="en-IN" smtClean="0"/>
-              <a:t>17-10-2023</a:t>
+              <a:t>18-10-2023</a:t>
             </a:fld>
             <a:endParaRPr lang="en-IN"/>
           </a:p>
@@ -3479,7 +3513,7 @@
         </p:spPr>
         <p:txBody>
           <a:bodyPr>
-            <a:normAutofit fontScale="85000" lnSpcReduction="20000"/>
+            <a:normAutofit fontScale="92500" lnSpcReduction="10000"/>
           </a:bodyPr>
           <a:lstStyle/>
           <a:p>
@@ -3534,19 +3568,23 @@
                 </a:solidFill>
                 <a:latin typeface="Bell MT" panose="02020503060305020303" pitchFamily="18" charset="0"/>
               </a:rPr>
-              <a:t>CHRISTALIN SHEMY C</a:t>
-            </a:r>
-          </a:p>
-          <a:p>
-            <a:r>
-              <a:rPr lang="en-US" dirty="0">
+              <a:t>CHRISTALIN </a:t>
+            </a:r>
+            <a:r>
+              <a:rPr lang="en-US">
                 <a:solidFill>
                   <a:schemeClr val="bg1"/>
                 </a:solidFill>
                 <a:latin typeface="Bell MT" panose="02020503060305020303" pitchFamily="18" charset="0"/>
               </a:rPr>
-              <a:t>JOSHEBA AGNES J F</a:t>
-            </a:r>
+              <a:t>SHEMY C</a:t>
+            </a:r>
+            <a:endParaRPr lang="en-US" dirty="0">
+              <a:solidFill>
+                <a:schemeClr val="bg1"/>
+              </a:solidFill>
+              <a:latin typeface="Bell MT" panose="02020503060305020303" pitchFamily="18" charset="0"/>
+            </a:endParaRPr>
           </a:p>
           <a:p>
             <a:r>

</xml_diff>